<commit_message>
Update Basic Python Training - Day 1.pptx
</commit_message>
<xml_diff>
--- a/Day_1/Basic Python Training - Day 1.pptx
+++ b/Day_1/Basic Python Training - Day 1.pptx
@@ -113,6 +113,11 @@
       </a:defRPr>
     </a:lvl9pPr>
   </p:defaultTextStyle>
+  <p:extLst>
+    <p:ext uri="{EFAFB233-063F-42B5-8137-9DF3F51BA10A}">
+      <p15:sldGuideLst xmlns:p15="http://schemas.microsoft.com/office/powerpoint/2012/main"/>
+    </p:ext>
+  </p:extLst>
 </p:presentation>
 </file>
 
@@ -1059,10 +1064,14 @@
         <a:lstStyle/>
         <a:p>
           <a:r>
+            <a:rPr lang="en-US" b="1" i="0" dirty="0"/>
+            <a:t>Introduction </a:t>
+          </a:r>
+          <a:r>
             <a:rPr lang="en-US" b="1" i="0"/>
-            <a:t>Introduction to Python, </a:t>
+            <a:t>to Python </a:t>
           </a:r>
-          <a:endParaRPr lang="en-US"/>
+          <a:endParaRPr lang="en-US" dirty="0"/>
         </a:p>
       </dgm:t>
     </dgm:pt>
@@ -1096,10 +1105,10 @@
         <a:lstStyle/>
         <a:p>
           <a:r>
-            <a:rPr lang="en-US" b="1" i="0"/>
-            <a:t>Variables/Data Types and </a:t>
+            <a:rPr lang="en-US" b="1" i="0" dirty="0"/>
+            <a:t>Variables and Data Types</a:t>
           </a:r>
-          <a:endParaRPr lang="en-US"/>
+          <a:endParaRPr lang="en-US" dirty="0"/>
         </a:p>
       </dgm:t>
     </dgm:pt>
@@ -1513,10 +1522,14 @@
             <a:buNone/>
           </a:pPr>
           <a:r>
+            <a:rPr lang="en-US" sz="2500" b="1" i="0" kern="1200" dirty="0"/>
+            <a:t>Introduction </a:t>
+          </a:r>
+          <a:r>
             <a:rPr lang="en-US" sz="2500" b="1" i="0" kern="1200"/>
-            <a:t>Introduction to Python, </a:t>
+            <a:t>to Python </a:t>
           </a:r>
-          <a:endParaRPr lang="en-US" sz="2500" kern="1200"/>
+          <a:endParaRPr lang="en-US" sz="2500" kern="1200" dirty="0"/>
         </a:p>
       </dsp:txBody>
       <dsp:txXfrm>
@@ -1666,10 +1679,10 @@
             <a:buNone/>
           </a:pPr>
           <a:r>
-            <a:rPr lang="en-US" sz="2500" b="1" i="0" kern="1200"/>
-            <a:t>Variables/Data Types and </a:t>
+            <a:rPr lang="en-US" sz="2500" b="1" i="0" kern="1200" dirty="0"/>
+            <a:t>Variables and Data Types</a:t>
           </a:r>
-          <a:endParaRPr lang="en-US" sz="2500" kern="1200"/>
+          <a:endParaRPr lang="en-US" sz="2500" kern="1200" dirty="0"/>
         </a:p>
       </dsp:txBody>
       <dsp:txXfrm>
@@ -6550,7 +6563,7 @@
             <p:ph idx="1"/>
             <p:extLst>
               <p:ext uri="{D42A27DB-BD31-4B8C-83A1-F6EECF244321}">
-                <p14:modId xmlns:p14="http://schemas.microsoft.com/office/powerpoint/2010/main" val="2425100058"/>
+                <p14:modId xmlns:p14="http://schemas.microsoft.com/office/powerpoint/2010/main" val="2349921102"/>
               </p:ext>
             </p:extLst>
           </p:nvPr>

</xml_diff>